<commit_message>
Etapa de ajuste final
</commit_message>
<xml_diff>
--- a/Apresentação/Apresentação TCC - Vinícius Andrade Lopes.pptx
+++ b/Apresentação/Apresentação TCC - Vinícius Andrade Lopes.pptx
@@ -17,6 +17,7 @@
     <p:sldId id="266" r:id="rId11"/>
     <p:sldId id="267" r:id="rId12"/>
     <p:sldId id="268" r:id="rId13"/>
+    <p:sldId id="269" r:id="rId14"/>
   </p:sldIdLst>
   <p:sldSz cx="12192000" cy="6858000"/>
   <p:notesSz cx="6858000" cy="9144000"/>
@@ -399,7 +400,7 @@
           <a:p>
             <a:fld id="{588D7303-1349-4B3B-906B-0AD17F7A84D3}" type="datetimeFigureOut">
               <a:rPr lang="pt-BR" smtClean="0"/>
-              <a:t>18/05/2023</a:t>
+              <a:t>19/05/2023</a:t>
             </a:fld>
             <a:endParaRPr lang="pt-BR"/>
           </a:p>
@@ -607,7 +608,7 @@
           <a:p>
             <a:fld id="{588D7303-1349-4B3B-906B-0AD17F7A84D3}" type="datetimeFigureOut">
               <a:rPr lang="pt-BR" smtClean="0"/>
-              <a:t>18/05/2023</a:t>
+              <a:t>19/05/2023</a:t>
             </a:fld>
             <a:endParaRPr lang="pt-BR"/>
           </a:p>
@@ -805,7 +806,7 @@
           <a:p>
             <a:fld id="{588D7303-1349-4B3B-906B-0AD17F7A84D3}" type="datetimeFigureOut">
               <a:rPr lang="pt-BR" smtClean="0"/>
-              <a:t>18/05/2023</a:t>
+              <a:t>19/05/2023</a:t>
             </a:fld>
             <a:endParaRPr lang="pt-BR"/>
           </a:p>
@@ -1080,7 +1081,7 @@
           <a:p>
             <a:fld id="{588D7303-1349-4B3B-906B-0AD17F7A84D3}" type="datetimeFigureOut">
               <a:rPr lang="pt-BR" smtClean="0"/>
-              <a:t>18/05/2023</a:t>
+              <a:t>19/05/2023</a:t>
             </a:fld>
             <a:endParaRPr lang="pt-BR"/>
           </a:p>
@@ -1345,7 +1346,7 @@
           <a:p>
             <a:fld id="{588D7303-1349-4B3B-906B-0AD17F7A84D3}" type="datetimeFigureOut">
               <a:rPr lang="pt-BR" smtClean="0"/>
-              <a:t>18/05/2023</a:t>
+              <a:t>19/05/2023</a:t>
             </a:fld>
             <a:endParaRPr lang="pt-BR"/>
           </a:p>
@@ -1757,7 +1758,7 @@
           <a:p>
             <a:fld id="{588D7303-1349-4B3B-906B-0AD17F7A84D3}" type="datetimeFigureOut">
               <a:rPr lang="pt-BR" smtClean="0"/>
-              <a:t>18/05/2023</a:t>
+              <a:t>19/05/2023</a:t>
             </a:fld>
             <a:endParaRPr lang="pt-BR"/>
           </a:p>
@@ -1898,7 +1899,7 @@
           <a:p>
             <a:fld id="{588D7303-1349-4B3B-906B-0AD17F7A84D3}" type="datetimeFigureOut">
               <a:rPr lang="pt-BR" smtClean="0"/>
-              <a:t>18/05/2023</a:t>
+              <a:t>19/05/2023</a:t>
             </a:fld>
             <a:endParaRPr lang="pt-BR"/>
           </a:p>
@@ -2011,7 +2012,7 @@
           <a:p>
             <a:fld id="{588D7303-1349-4B3B-906B-0AD17F7A84D3}" type="datetimeFigureOut">
               <a:rPr lang="pt-BR" smtClean="0"/>
-              <a:t>18/05/2023</a:t>
+              <a:t>19/05/2023</a:t>
             </a:fld>
             <a:endParaRPr lang="pt-BR"/>
           </a:p>
@@ -2322,7 +2323,7 @@
           <a:p>
             <a:fld id="{588D7303-1349-4B3B-906B-0AD17F7A84D3}" type="datetimeFigureOut">
               <a:rPr lang="pt-BR" smtClean="0"/>
-              <a:t>18/05/2023</a:t>
+              <a:t>19/05/2023</a:t>
             </a:fld>
             <a:endParaRPr lang="pt-BR"/>
           </a:p>
@@ -2610,7 +2611,7 @@
           <a:p>
             <a:fld id="{588D7303-1349-4B3B-906B-0AD17F7A84D3}" type="datetimeFigureOut">
               <a:rPr lang="pt-BR" smtClean="0"/>
-              <a:t>18/05/2023</a:t>
+              <a:t>19/05/2023</a:t>
             </a:fld>
             <a:endParaRPr lang="pt-BR"/>
           </a:p>
@@ -2860,7 +2861,7 @@
           <a:p>
             <a:fld id="{588D7303-1349-4B3B-906B-0AD17F7A84D3}" type="datetimeFigureOut">
               <a:rPr lang="pt-BR" smtClean="0"/>
-              <a:t>18/05/2023</a:t>
+              <a:t>19/05/2023</a:t>
             </a:fld>
             <a:endParaRPr lang="pt-BR"/>
           </a:p>
@@ -4129,6 +4130,342 @@
           </a:p>
         </p:txBody>
       </p:sp>
+      <p:sp>
+        <p:nvSpPr>
+          <p:cNvPr id="4" name="Espaço Reservado para Conteúdo 2">
+            <a:extLst>
+              <a:ext uri="{FF2B5EF4-FFF2-40B4-BE49-F238E27FC236}">
+                <a16:creationId xmlns:a16="http://schemas.microsoft.com/office/drawing/2014/main" id="{9C4DD9EF-870B-56AC-5689-25272D455F4A}"/>
+              </a:ext>
+            </a:extLst>
+          </p:cNvPr>
+          <p:cNvSpPr txBox="1">
+            <a:spLocks/>
+          </p:cNvSpPr>
+          <p:nvPr/>
+        </p:nvSpPr>
+        <p:spPr>
+          <a:xfrm>
+            <a:off x="317460" y="1802892"/>
+            <a:ext cx="5643012" cy="3986277"/>
+          </a:xfrm>
+          <a:prstGeom prst="rect">
+            <a:avLst/>
+          </a:prstGeom>
+        </p:spPr>
+        <p:txBody>
+          <a:bodyPr vert="horz" lIns="91440" tIns="45720" rIns="91440" bIns="45720" rtlCol="0">
+            <a:noAutofit/>
+          </a:bodyPr>
+          <a:lstStyle>
+            <a:lvl1pPr marL="228600" indent="-228600" algn="l" defTabSz="914400" rtl="0" eaLnBrk="1" latinLnBrk="0" hangingPunct="1">
+              <a:lnSpc>
+                <a:spcPct val="90000"/>
+              </a:lnSpc>
+              <a:spcBef>
+                <a:spcPts val="1000"/>
+              </a:spcBef>
+              <a:buFont typeface="Arial" panose="020B0604020202020204" pitchFamily="34" charset="0"/>
+              <a:buChar char="•"/>
+              <a:defRPr sz="2800" kern="1200">
+                <a:solidFill>
+                  <a:schemeClr val="tx1"/>
+                </a:solidFill>
+                <a:latin typeface="+mn-lt"/>
+                <a:ea typeface="+mn-ea"/>
+                <a:cs typeface="+mn-cs"/>
+              </a:defRPr>
+            </a:lvl1pPr>
+            <a:lvl2pPr marL="685800" indent="-228600" algn="l" defTabSz="914400" rtl="0" eaLnBrk="1" latinLnBrk="0" hangingPunct="1">
+              <a:lnSpc>
+                <a:spcPct val="90000"/>
+              </a:lnSpc>
+              <a:spcBef>
+                <a:spcPts val="500"/>
+              </a:spcBef>
+              <a:buFont typeface="Arial" panose="020B0604020202020204" pitchFamily="34" charset="0"/>
+              <a:buChar char="•"/>
+              <a:defRPr sz="2400" kern="1200">
+                <a:solidFill>
+                  <a:schemeClr val="tx1"/>
+                </a:solidFill>
+                <a:latin typeface="+mn-lt"/>
+                <a:ea typeface="+mn-ea"/>
+                <a:cs typeface="+mn-cs"/>
+              </a:defRPr>
+            </a:lvl2pPr>
+            <a:lvl3pPr marL="1143000" indent="-228600" algn="l" defTabSz="914400" rtl="0" eaLnBrk="1" latinLnBrk="0" hangingPunct="1">
+              <a:lnSpc>
+                <a:spcPct val="90000"/>
+              </a:lnSpc>
+              <a:spcBef>
+                <a:spcPts val="500"/>
+              </a:spcBef>
+              <a:buFont typeface="Arial" panose="020B0604020202020204" pitchFamily="34" charset="0"/>
+              <a:buChar char="•"/>
+              <a:defRPr sz="2000" kern="1200">
+                <a:solidFill>
+                  <a:schemeClr val="tx1"/>
+                </a:solidFill>
+                <a:latin typeface="+mn-lt"/>
+                <a:ea typeface="+mn-ea"/>
+                <a:cs typeface="+mn-cs"/>
+              </a:defRPr>
+            </a:lvl3pPr>
+            <a:lvl4pPr marL="1600200" indent="-228600" algn="l" defTabSz="914400" rtl="0" eaLnBrk="1" latinLnBrk="0" hangingPunct="1">
+              <a:lnSpc>
+                <a:spcPct val="90000"/>
+              </a:lnSpc>
+              <a:spcBef>
+                <a:spcPts val="500"/>
+              </a:spcBef>
+              <a:buFont typeface="Arial" panose="020B0604020202020204" pitchFamily="34" charset="0"/>
+              <a:buChar char="•"/>
+              <a:defRPr sz="1800" kern="1200">
+                <a:solidFill>
+                  <a:schemeClr val="tx1"/>
+                </a:solidFill>
+                <a:latin typeface="+mn-lt"/>
+                <a:ea typeface="+mn-ea"/>
+                <a:cs typeface="+mn-cs"/>
+              </a:defRPr>
+            </a:lvl4pPr>
+            <a:lvl5pPr marL="2057400" indent="-228600" algn="l" defTabSz="914400" rtl="0" eaLnBrk="1" latinLnBrk="0" hangingPunct="1">
+              <a:lnSpc>
+                <a:spcPct val="90000"/>
+              </a:lnSpc>
+              <a:spcBef>
+                <a:spcPts val="500"/>
+              </a:spcBef>
+              <a:buFont typeface="Arial" panose="020B0604020202020204" pitchFamily="34" charset="0"/>
+              <a:buChar char="•"/>
+              <a:defRPr sz="1800" kern="1200">
+                <a:solidFill>
+                  <a:schemeClr val="tx1"/>
+                </a:solidFill>
+                <a:latin typeface="+mn-lt"/>
+                <a:ea typeface="+mn-ea"/>
+                <a:cs typeface="+mn-cs"/>
+              </a:defRPr>
+            </a:lvl5pPr>
+            <a:lvl6pPr marL="2514600" indent="-228600" algn="l" defTabSz="914400" rtl="0" eaLnBrk="1" latinLnBrk="0" hangingPunct="1">
+              <a:lnSpc>
+                <a:spcPct val="90000"/>
+              </a:lnSpc>
+              <a:spcBef>
+                <a:spcPts val="500"/>
+              </a:spcBef>
+              <a:buFont typeface="Arial" panose="020B0604020202020204" pitchFamily="34" charset="0"/>
+              <a:buChar char="•"/>
+              <a:defRPr sz="1800" kern="1200">
+                <a:solidFill>
+                  <a:schemeClr val="tx1"/>
+                </a:solidFill>
+                <a:latin typeface="+mn-lt"/>
+                <a:ea typeface="+mn-ea"/>
+                <a:cs typeface="+mn-cs"/>
+              </a:defRPr>
+            </a:lvl6pPr>
+            <a:lvl7pPr marL="2971800" indent="-228600" algn="l" defTabSz="914400" rtl="0" eaLnBrk="1" latinLnBrk="0" hangingPunct="1">
+              <a:lnSpc>
+                <a:spcPct val="90000"/>
+              </a:lnSpc>
+              <a:spcBef>
+                <a:spcPts val="500"/>
+              </a:spcBef>
+              <a:buFont typeface="Arial" panose="020B0604020202020204" pitchFamily="34" charset="0"/>
+              <a:buChar char="•"/>
+              <a:defRPr sz="1800" kern="1200">
+                <a:solidFill>
+                  <a:schemeClr val="tx1"/>
+                </a:solidFill>
+                <a:latin typeface="+mn-lt"/>
+                <a:ea typeface="+mn-ea"/>
+                <a:cs typeface="+mn-cs"/>
+              </a:defRPr>
+            </a:lvl7pPr>
+            <a:lvl8pPr marL="3429000" indent="-228600" algn="l" defTabSz="914400" rtl="0" eaLnBrk="1" latinLnBrk="0" hangingPunct="1">
+              <a:lnSpc>
+                <a:spcPct val="90000"/>
+              </a:lnSpc>
+              <a:spcBef>
+                <a:spcPts val="500"/>
+              </a:spcBef>
+              <a:buFont typeface="Arial" panose="020B0604020202020204" pitchFamily="34" charset="0"/>
+              <a:buChar char="•"/>
+              <a:defRPr sz="1800" kern="1200">
+                <a:solidFill>
+                  <a:schemeClr val="tx1"/>
+                </a:solidFill>
+                <a:latin typeface="+mn-lt"/>
+                <a:ea typeface="+mn-ea"/>
+                <a:cs typeface="+mn-cs"/>
+              </a:defRPr>
+            </a:lvl8pPr>
+            <a:lvl9pPr marL="3886200" indent="-228600" algn="l" defTabSz="914400" rtl="0" eaLnBrk="1" latinLnBrk="0" hangingPunct="1">
+              <a:lnSpc>
+                <a:spcPct val="90000"/>
+              </a:lnSpc>
+              <a:spcBef>
+                <a:spcPts val="500"/>
+              </a:spcBef>
+              <a:buFont typeface="Arial" panose="020B0604020202020204" pitchFamily="34" charset="0"/>
+              <a:buChar char="•"/>
+              <a:defRPr sz="1800" kern="1200">
+                <a:solidFill>
+                  <a:schemeClr val="tx1"/>
+                </a:solidFill>
+                <a:latin typeface="+mn-lt"/>
+                <a:ea typeface="+mn-ea"/>
+                <a:cs typeface="+mn-cs"/>
+              </a:defRPr>
+            </a:lvl9pPr>
+          </a:lstStyle>
+          <a:p>
+            <a:pPr algn="just"/>
+            <a:r>
+              <a:rPr lang="pt-BR" sz="2000" dirty="0">
+                <a:solidFill>
+                  <a:schemeClr val="bg2">
+                    <a:lumMod val="25000"/>
+                  </a:schemeClr>
+                </a:solidFill>
+              </a:rPr>
+              <a:t>Similaridade</a:t>
+            </a:r>
+          </a:p>
+          <a:p>
+            <a:pPr lvl="1" algn="just"/>
+            <a:r>
+              <a:rPr lang="pt-BR" sz="1600" dirty="0">
+                <a:solidFill>
+                  <a:schemeClr val="bg2">
+                    <a:lumMod val="25000"/>
+                  </a:schemeClr>
+                </a:solidFill>
+              </a:rPr>
+              <a:t>Medida que avalia o grau de semelhança entre dois ou mais elementos linguísticos.</a:t>
+            </a:r>
+          </a:p>
+          <a:p>
+            <a:pPr lvl="1" algn="just"/>
+            <a:r>
+              <a:rPr lang="pt-BR" sz="1600" dirty="0">
+                <a:solidFill>
+                  <a:schemeClr val="bg2">
+                    <a:lumMod val="25000"/>
+                  </a:schemeClr>
+                </a:solidFill>
+              </a:rPr>
+              <a:t>Categorização.</a:t>
+            </a:r>
+          </a:p>
+          <a:p>
+            <a:pPr lvl="1" algn="just"/>
+            <a:r>
+              <a:rPr lang="pt-BR" sz="1600" dirty="0">
+                <a:solidFill>
+                  <a:schemeClr val="bg2">
+                    <a:lumMod val="25000"/>
+                  </a:schemeClr>
+                </a:solidFill>
+              </a:rPr>
+              <a:t>Classificação de sentimentos.</a:t>
+            </a:r>
+          </a:p>
+          <a:p>
+            <a:pPr algn="just"/>
+            <a:r>
+              <a:rPr lang="pt-BR" sz="2000" dirty="0">
+                <a:solidFill>
+                  <a:schemeClr val="bg2">
+                    <a:lumMod val="25000"/>
+                  </a:schemeClr>
+                </a:solidFill>
+              </a:rPr>
+              <a:t>Concordância.</a:t>
+            </a:r>
+          </a:p>
+          <a:p>
+            <a:pPr lvl="1" algn="just"/>
+            <a:r>
+              <a:rPr lang="pt-BR" sz="1600" dirty="0">
+                <a:solidFill>
+                  <a:schemeClr val="bg2">
+                    <a:lumMod val="25000"/>
+                  </a:schemeClr>
+                </a:solidFill>
+              </a:rPr>
+              <a:t>Permite analisar como as palavras são usadas em diferentes contextos.</a:t>
+            </a:r>
+          </a:p>
+          <a:p>
+            <a:pPr lvl="1" algn="just"/>
+            <a:r>
+              <a:rPr lang="pt-BR" sz="1600" dirty="0">
+                <a:solidFill>
+                  <a:schemeClr val="bg2">
+                    <a:lumMod val="25000"/>
+                  </a:schemeClr>
+                </a:solidFill>
+              </a:rPr>
+              <a:t>Concordância com outras palavras em uma frase.</a:t>
+            </a:r>
+          </a:p>
+          <a:p>
+            <a:pPr algn="just"/>
+            <a:r>
+              <a:rPr lang="pt-BR" sz="2000" dirty="0">
+                <a:solidFill>
+                  <a:schemeClr val="bg2">
+                    <a:lumMod val="25000"/>
+                  </a:schemeClr>
+                </a:solidFill>
+              </a:rPr>
+              <a:t>Bigramas.</a:t>
+            </a:r>
+          </a:p>
+          <a:p>
+            <a:pPr lvl="1" algn="just"/>
+            <a:r>
+              <a:rPr lang="pt-BR" sz="1600" dirty="0">
+                <a:solidFill>
+                  <a:schemeClr val="bg2">
+                    <a:lumMod val="25000"/>
+                  </a:schemeClr>
+                </a:solidFill>
+              </a:rPr>
+              <a:t>Palavras consecutivas.</a:t>
+            </a:r>
+          </a:p>
+          <a:p>
+            <a:pPr lvl="1" algn="just"/>
+            <a:r>
+              <a:rPr lang="pt-BR" sz="1600" dirty="0">
+                <a:solidFill>
+                  <a:schemeClr val="bg2">
+                    <a:lumMod val="25000"/>
+                  </a:schemeClr>
+                </a:solidFill>
+              </a:rPr>
+              <a:t>Sequência de duas palavras consecutivas em um texto.</a:t>
+            </a:r>
+          </a:p>
+          <a:p>
+            <a:pPr lvl="1" algn="just"/>
+            <a:r>
+              <a:rPr lang="pt-BR" sz="1600" dirty="0">
+                <a:solidFill>
+                  <a:schemeClr val="bg2">
+                    <a:lumMod val="25000"/>
+                  </a:schemeClr>
+                </a:solidFill>
+              </a:rPr>
+              <a:t>Padrões de uso de palavras.</a:t>
+            </a:r>
+          </a:p>
+        </p:txBody>
+      </p:sp>
     </p:spTree>
     <p:extLst>
       <p:ext uri="{BB962C8B-B14F-4D97-AF65-F5344CB8AC3E}">
@@ -5381,6 +5718,351 @@
 </p:sld>
 </file>
 
+<file path=ppt/slides/slide13.xml><?xml version="1.0" encoding="utf-8"?>
+<p:sld xmlns:a="http://schemas.openxmlformats.org/drawingml/2006/main" xmlns:r="http://schemas.openxmlformats.org/officeDocument/2006/relationships" xmlns:p="http://schemas.openxmlformats.org/presentationml/2006/main">
+  <p:cSld>
+    <p:spTree>
+      <p:nvGrpSpPr>
+        <p:cNvPr id="1" name=""/>
+        <p:cNvGrpSpPr/>
+        <p:nvPr/>
+      </p:nvGrpSpPr>
+      <p:grpSpPr>
+        <a:xfrm>
+          <a:off x="0" y="0"/>
+          <a:ext cx="0" cy="0"/>
+          <a:chOff x="0" y="0"/>
+          <a:chExt cx="0" cy="0"/>
+        </a:xfrm>
+      </p:grpSpPr>
+      <p:sp>
+        <p:nvSpPr>
+          <p:cNvPr id="2" name="Arrow: Pentagon 3">
+            <a:extLst>
+              <a:ext uri="{FF2B5EF4-FFF2-40B4-BE49-F238E27FC236}">
+                <a16:creationId xmlns:a16="http://schemas.microsoft.com/office/drawing/2014/main" id="{9A4880F5-21A6-54BC-FC82-3BB671B0E173}"/>
+              </a:ext>
+            </a:extLst>
+          </p:cNvPr>
+          <p:cNvSpPr/>
+          <p:nvPr/>
+        </p:nvSpPr>
+        <p:spPr>
+          <a:xfrm>
+            <a:off x="0" y="178295"/>
+            <a:ext cx="4975200" cy="630000"/>
+          </a:xfrm>
+          <a:prstGeom prst="homePlate">
+            <a:avLst/>
+          </a:prstGeom>
+          <a:solidFill>
+            <a:schemeClr val="bg2">
+              <a:lumMod val="25000"/>
+              <a:alpha val="85000"/>
+            </a:schemeClr>
+          </a:solidFill>
+        </p:spPr>
+        <p:style>
+          <a:lnRef idx="1">
+            <a:schemeClr val="accent3"/>
+          </a:lnRef>
+          <a:fillRef idx="3">
+            <a:schemeClr val="accent3"/>
+          </a:fillRef>
+          <a:effectRef idx="2">
+            <a:schemeClr val="accent3"/>
+          </a:effectRef>
+          <a:fontRef idx="minor">
+            <a:schemeClr val="lt1"/>
+          </a:fontRef>
+        </p:style>
+        <p:txBody>
+          <a:bodyPr rtlCol="0" anchor="ctr"/>
+          <a:lstStyle/>
+          <a:p>
+            <a:pPr algn="ctr"/>
+            <a:r>
+              <a:rPr lang="pt-BR" sz="3200" dirty="0">
+                <a:solidFill>
+                  <a:schemeClr val="bg1"/>
+                </a:solidFill>
+              </a:rPr>
+              <a:t>CONCLUSÃO</a:t>
+            </a:r>
+          </a:p>
+        </p:txBody>
+      </p:sp>
+      <p:sp>
+        <p:nvSpPr>
+          <p:cNvPr id="9" name="Espaço Reservado para Conteúdo 2">
+            <a:extLst>
+              <a:ext uri="{FF2B5EF4-FFF2-40B4-BE49-F238E27FC236}">
+                <a16:creationId xmlns:a16="http://schemas.microsoft.com/office/drawing/2014/main" id="{BA2E9260-8C4E-550C-6D64-86415D17FABF}"/>
+              </a:ext>
+            </a:extLst>
+          </p:cNvPr>
+          <p:cNvSpPr txBox="1">
+            <a:spLocks/>
+          </p:cNvSpPr>
+          <p:nvPr/>
+        </p:nvSpPr>
+        <p:spPr>
+          <a:xfrm>
+            <a:off x="317460" y="1017918"/>
+            <a:ext cx="11569740" cy="3959524"/>
+          </a:xfrm>
+          <a:prstGeom prst="rect">
+            <a:avLst/>
+          </a:prstGeom>
+        </p:spPr>
+        <p:txBody>
+          <a:bodyPr vert="horz" lIns="91440" tIns="45720" rIns="91440" bIns="45720" rtlCol="0">
+            <a:noAutofit/>
+          </a:bodyPr>
+          <a:lstStyle>
+            <a:lvl1pPr marL="228600" indent="-228600" algn="l" defTabSz="914400" rtl="0" eaLnBrk="1" latinLnBrk="0" hangingPunct="1">
+              <a:lnSpc>
+                <a:spcPct val="90000"/>
+              </a:lnSpc>
+              <a:spcBef>
+                <a:spcPts val="1000"/>
+              </a:spcBef>
+              <a:buFont typeface="Arial" panose="020B0604020202020204" pitchFamily="34" charset="0"/>
+              <a:buChar char="•"/>
+              <a:defRPr sz="2800" kern="1200">
+                <a:solidFill>
+                  <a:schemeClr val="tx1"/>
+                </a:solidFill>
+                <a:latin typeface="+mn-lt"/>
+                <a:ea typeface="+mn-ea"/>
+                <a:cs typeface="+mn-cs"/>
+              </a:defRPr>
+            </a:lvl1pPr>
+            <a:lvl2pPr marL="685800" indent="-228600" algn="l" defTabSz="914400" rtl="0" eaLnBrk="1" latinLnBrk="0" hangingPunct="1">
+              <a:lnSpc>
+                <a:spcPct val="90000"/>
+              </a:lnSpc>
+              <a:spcBef>
+                <a:spcPts val="500"/>
+              </a:spcBef>
+              <a:buFont typeface="Arial" panose="020B0604020202020204" pitchFamily="34" charset="0"/>
+              <a:buChar char="•"/>
+              <a:defRPr sz="2400" kern="1200">
+                <a:solidFill>
+                  <a:schemeClr val="tx1"/>
+                </a:solidFill>
+                <a:latin typeface="+mn-lt"/>
+                <a:ea typeface="+mn-ea"/>
+                <a:cs typeface="+mn-cs"/>
+              </a:defRPr>
+            </a:lvl2pPr>
+            <a:lvl3pPr marL="1143000" indent="-228600" algn="l" defTabSz="914400" rtl="0" eaLnBrk="1" latinLnBrk="0" hangingPunct="1">
+              <a:lnSpc>
+                <a:spcPct val="90000"/>
+              </a:lnSpc>
+              <a:spcBef>
+                <a:spcPts val="500"/>
+              </a:spcBef>
+              <a:buFont typeface="Arial" panose="020B0604020202020204" pitchFamily="34" charset="0"/>
+              <a:buChar char="•"/>
+              <a:defRPr sz="2000" kern="1200">
+                <a:solidFill>
+                  <a:schemeClr val="tx1"/>
+                </a:solidFill>
+                <a:latin typeface="+mn-lt"/>
+                <a:ea typeface="+mn-ea"/>
+                <a:cs typeface="+mn-cs"/>
+              </a:defRPr>
+            </a:lvl3pPr>
+            <a:lvl4pPr marL="1600200" indent="-228600" algn="l" defTabSz="914400" rtl="0" eaLnBrk="1" latinLnBrk="0" hangingPunct="1">
+              <a:lnSpc>
+                <a:spcPct val="90000"/>
+              </a:lnSpc>
+              <a:spcBef>
+                <a:spcPts val="500"/>
+              </a:spcBef>
+              <a:buFont typeface="Arial" panose="020B0604020202020204" pitchFamily="34" charset="0"/>
+              <a:buChar char="•"/>
+              <a:defRPr sz="1800" kern="1200">
+                <a:solidFill>
+                  <a:schemeClr val="tx1"/>
+                </a:solidFill>
+                <a:latin typeface="+mn-lt"/>
+                <a:ea typeface="+mn-ea"/>
+                <a:cs typeface="+mn-cs"/>
+              </a:defRPr>
+            </a:lvl4pPr>
+            <a:lvl5pPr marL="2057400" indent="-228600" algn="l" defTabSz="914400" rtl="0" eaLnBrk="1" latinLnBrk="0" hangingPunct="1">
+              <a:lnSpc>
+                <a:spcPct val="90000"/>
+              </a:lnSpc>
+              <a:spcBef>
+                <a:spcPts val="500"/>
+              </a:spcBef>
+              <a:buFont typeface="Arial" panose="020B0604020202020204" pitchFamily="34" charset="0"/>
+              <a:buChar char="•"/>
+              <a:defRPr sz="1800" kern="1200">
+                <a:solidFill>
+                  <a:schemeClr val="tx1"/>
+                </a:solidFill>
+                <a:latin typeface="+mn-lt"/>
+                <a:ea typeface="+mn-ea"/>
+                <a:cs typeface="+mn-cs"/>
+              </a:defRPr>
+            </a:lvl5pPr>
+            <a:lvl6pPr marL="2514600" indent="-228600" algn="l" defTabSz="914400" rtl="0" eaLnBrk="1" latinLnBrk="0" hangingPunct="1">
+              <a:lnSpc>
+                <a:spcPct val="90000"/>
+              </a:lnSpc>
+              <a:spcBef>
+                <a:spcPts val="500"/>
+              </a:spcBef>
+              <a:buFont typeface="Arial" panose="020B0604020202020204" pitchFamily="34" charset="0"/>
+              <a:buChar char="•"/>
+              <a:defRPr sz="1800" kern="1200">
+                <a:solidFill>
+                  <a:schemeClr val="tx1"/>
+                </a:solidFill>
+                <a:latin typeface="+mn-lt"/>
+                <a:ea typeface="+mn-ea"/>
+                <a:cs typeface="+mn-cs"/>
+              </a:defRPr>
+            </a:lvl6pPr>
+            <a:lvl7pPr marL="2971800" indent="-228600" algn="l" defTabSz="914400" rtl="0" eaLnBrk="1" latinLnBrk="0" hangingPunct="1">
+              <a:lnSpc>
+                <a:spcPct val="90000"/>
+              </a:lnSpc>
+              <a:spcBef>
+                <a:spcPts val="500"/>
+              </a:spcBef>
+              <a:buFont typeface="Arial" panose="020B0604020202020204" pitchFamily="34" charset="0"/>
+              <a:buChar char="•"/>
+              <a:defRPr sz="1800" kern="1200">
+                <a:solidFill>
+                  <a:schemeClr val="tx1"/>
+                </a:solidFill>
+                <a:latin typeface="+mn-lt"/>
+                <a:ea typeface="+mn-ea"/>
+                <a:cs typeface="+mn-cs"/>
+              </a:defRPr>
+            </a:lvl7pPr>
+            <a:lvl8pPr marL="3429000" indent="-228600" algn="l" defTabSz="914400" rtl="0" eaLnBrk="1" latinLnBrk="0" hangingPunct="1">
+              <a:lnSpc>
+                <a:spcPct val="90000"/>
+              </a:lnSpc>
+              <a:spcBef>
+                <a:spcPts val="500"/>
+              </a:spcBef>
+              <a:buFont typeface="Arial" panose="020B0604020202020204" pitchFamily="34" charset="0"/>
+              <a:buChar char="•"/>
+              <a:defRPr sz="1800" kern="1200">
+                <a:solidFill>
+                  <a:schemeClr val="tx1"/>
+                </a:solidFill>
+                <a:latin typeface="+mn-lt"/>
+                <a:ea typeface="+mn-ea"/>
+                <a:cs typeface="+mn-cs"/>
+              </a:defRPr>
+            </a:lvl8pPr>
+            <a:lvl9pPr marL="3886200" indent="-228600" algn="l" defTabSz="914400" rtl="0" eaLnBrk="1" latinLnBrk="0" hangingPunct="1">
+              <a:lnSpc>
+                <a:spcPct val="90000"/>
+              </a:lnSpc>
+              <a:spcBef>
+                <a:spcPts val="500"/>
+              </a:spcBef>
+              <a:buFont typeface="Arial" panose="020B0604020202020204" pitchFamily="34" charset="0"/>
+              <a:buChar char="•"/>
+              <a:defRPr sz="1800" kern="1200">
+                <a:solidFill>
+                  <a:schemeClr val="tx1"/>
+                </a:solidFill>
+                <a:latin typeface="+mn-lt"/>
+                <a:ea typeface="+mn-ea"/>
+                <a:cs typeface="+mn-cs"/>
+              </a:defRPr>
+            </a:lvl9pPr>
+          </a:lstStyle>
+          <a:p>
+            <a:pPr algn="just"/>
+            <a:r>
+              <a:rPr lang="pt-BR" sz="1800" dirty="0">
+                <a:solidFill>
+                  <a:schemeClr val="bg2">
+                    <a:lumMod val="25000"/>
+                  </a:schemeClr>
+                </a:solidFill>
+              </a:rPr>
+              <a:t>As ferramentas disponibilizadas pela biblioteca NLTK são robustas o suficiente para gerar análises avançadas. Porém, é necessários ter um certo conhecimento para implementar essas funcionalidades.</a:t>
+            </a:r>
+          </a:p>
+          <a:p>
+            <a:pPr algn="just"/>
+            <a:r>
+              <a:rPr lang="pt-BR" sz="1800" dirty="0">
+                <a:solidFill>
+                  <a:schemeClr val="bg2">
+                    <a:lumMod val="25000"/>
+                  </a:schemeClr>
+                </a:solidFill>
+              </a:rPr>
+              <a:t>Entender toda a estrutura/formatação dos dados que serão analisados é de suma importância para a etapa de pré-processamento das informações.</a:t>
+            </a:r>
+          </a:p>
+          <a:p>
+            <a:pPr algn="just"/>
+            <a:r>
+              <a:rPr lang="pt-BR" sz="1800" dirty="0">
+                <a:solidFill>
+                  <a:schemeClr val="bg2">
+                    <a:lumMod val="25000"/>
+                  </a:schemeClr>
+                </a:solidFill>
+              </a:rPr>
+              <a:t>Um fluxo robusto de extração, transformação e armazenamento de dados será decisivo para definição das etapas analíticas.</a:t>
+            </a:r>
+          </a:p>
+          <a:p>
+            <a:pPr algn="just"/>
+            <a:r>
+              <a:rPr lang="pt-BR" sz="1800" dirty="0">
+                <a:solidFill>
+                  <a:schemeClr val="bg2">
+                    <a:lumMod val="25000"/>
+                  </a:schemeClr>
+                </a:solidFill>
+              </a:rPr>
+              <a:t>Foi possível constatar o funcionamento analítico da biblioteca em mais de um idioma.</a:t>
+            </a:r>
+          </a:p>
+          <a:p>
+            <a:pPr algn="just"/>
+            <a:r>
+              <a:rPr lang="pt-BR" sz="1800" dirty="0">
+                <a:solidFill>
+                  <a:schemeClr val="bg2">
+                    <a:lumMod val="25000"/>
+                  </a:schemeClr>
+                </a:solidFill>
+              </a:rPr>
+              <a:t>Com a aplicação das técnicas de similaridade, concordância e bigramas, foi possível entender o significado de algumas palavras, mesmo para quem não teve contato com o universo Harry Potter.</a:t>
+            </a:r>
+          </a:p>
+        </p:txBody>
+      </p:sp>
+    </p:spTree>
+    <p:extLst>
+      <p:ext uri="{BB962C8B-B14F-4D97-AF65-F5344CB8AC3E}">
+        <p14:creationId xmlns:p14="http://schemas.microsoft.com/office/powerpoint/2010/main" val="734470075"/>
+      </p:ext>
+    </p:extLst>
+  </p:cSld>
+  <p:clrMapOvr>
+    <a:masterClrMapping/>
+  </p:clrMapOvr>
+</p:sld>
+</file>
+
 <file path=ppt/slides/slide2.xml><?xml version="1.0" encoding="utf-8"?>
 <p:sld xmlns:a="http://schemas.openxmlformats.org/drawingml/2006/main" xmlns:r="http://schemas.openxmlformats.org/officeDocument/2006/relationships" xmlns:p="http://schemas.openxmlformats.org/presentationml/2006/main">
   <p:cSld>
@@ -5416,19 +6098,19 @@
         </p:nvSpPr>
         <p:spPr>
           <a:xfrm>
-            <a:off x="539483" y="2051214"/>
-            <a:ext cx="4974204" cy="3204143"/>
+            <a:off x="410087" y="1688905"/>
+            <a:ext cx="4974204" cy="4185684"/>
           </a:xfrm>
         </p:spPr>
         <p:txBody>
           <a:bodyPr>
-            <a:normAutofit/>
+            <a:noAutofit/>
           </a:bodyPr>
           <a:lstStyle/>
           <a:p>
             <a:pPr algn="just"/>
             <a:r>
-              <a:rPr lang="pt-BR" sz="1600" dirty="0">
+              <a:rPr lang="pt-BR" sz="2400" dirty="0">
                 <a:solidFill>
                   <a:schemeClr val="bg2">
                     <a:lumMod val="25000"/>
@@ -5442,7 +6124,7 @@
           <a:p>
             <a:pPr algn="just"/>
             <a:r>
-              <a:rPr lang="pt-BR" sz="1600" dirty="0">
+              <a:rPr lang="pt-BR" sz="2400" dirty="0">
                 <a:solidFill>
                   <a:schemeClr val="bg2">
                     <a:lumMod val="25000"/>
@@ -5459,7 +6141,7 @@
               <a:buAutoNum type="alphaLcPeriod"/>
             </a:pPr>
             <a:r>
-              <a:rPr lang="pt-BR" sz="1600" dirty="0">
+              <a:rPr lang="pt-BR" dirty="0">
                 <a:solidFill>
                   <a:schemeClr val="bg2">
                     <a:lumMod val="25000"/>
@@ -5476,7 +6158,7 @@
               <a:buAutoNum type="alphaLcPeriod"/>
             </a:pPr>
             <a:r>
-              <a:rPr lang="pt-BR" sz="1600" dirty="0">
+              <a:rPr lang="pt-BR" dirty="0">
                 <a:solidFill>
                   <a:schemeClr val="bg2">
                     <a:lumMod val="25000"/>
@@ -5493,7 +6175,7 @@
               <a:buAutoNum type="alphaLcPeriod"/>
             </a:pPr>
             <a:r>
-              <a:rPr lang="pt-BR" sz="1600" dirty="0">
+              <a:rPr lang="pt-BR" dirty="0">
                 <a:solidFill>
                   <a:schemeClr val="bg2">
                     <a:lumMod val="25000"/>
@@ -5510,7 +6192,7 @@
               <a:buAutoNum type="alphaLcPeriod"/>
             </a:pPr>
             <a:r>
-              <a:rPr lang="pt-BR" sz="1600" dirty="0">
+              <a:rPr lang="pt-BR" dirty="0">
                 <a:solidFill>
                   <a:schemeClr val="bg2">
                     <a:lumMod val="25000"/>
@@ -5524,7 +6206,7 @@
           <a:p>
             <a:pPr algn="just"/>
             <a:r>
-              <a:rPr lang="pt-BR" sz="1600" dirty="0">
+              <a:rPr lang="pt-BR" sz="2400" dirty="0">
                 <a:solidFill>
                   <a:schemeClr val="bg2">
                     <a:lumMod val="25000"/>
@@ -5538,7 +6220,7 @@
           <a:p>
             <a:pPr algn="just"/>
             <a:r>
-              <a:rPr lang="pt-BR" sz="1600" dirty="0">
+              <a:rPr lang="pt-BR" sz="2400" dirty="0">
                 <a:solidFill>
                   <a:schemeClr val="bg2">
                     <a:lumMod val="25000"/>
@@ -5552,7 +6234,7 @@
           <a:p>
             <a:pPr algn="just"/>
             <a:r>
-              <a:rPr lang="pt-BR" sz="1600" dirty="0">
+              <a:rPr lang="pt-BR" sz="2400" dirty="0">
                 <a:solidFill>
                   <a:schemeClr val="bg2">
                     <a:lumMod val="25000"/>
@@ -5638,8 +6320,8 @@
         </p:nvSpPr>
         <p:spPr>
           <a:xfrm>
-            <a:off x="5841668" y="2540181"/>
-            <a:ext cx="5810849" cy="1777638"/>
+            <a:off x="5876173" y="2253501"/>
+            <a:ext cx="6011027" cy="2350997"/>
           </a:xfrm>
           <a:prstGeom prst="rect">
             <a:avLst/>
@@ -5848,7 +6530,7 @@
               <a:buNone/>
             </a:pPr>
             <a:r>
-              <a:rPr lang="pt-BR" sz="1600" dirty="0">
+              <a:rPr lang="pt-BR" sz="2000" dirty="0">
                 <a:solidFill>
                   <a:schemeClr val="bg2">
                     <a:lumMod val="10000"/>
@@ -5859,7 +6541,7 @@
               </a:rPr>
               <a:t>Desenvolver uma base de dados estruturada, sem erros de formatação e com os devidos parâmetros definidos, facilita a objetividade da visualização e análise das informações (Wickham, 2016).</a:t>
             </a:r>
-            <a:endParaRPr lang="pt-BR" sz="1600" dirty="0">
+            <a:endParaRPr lang="pt-BR" sz="2000" dirty="0">
               <a:solidFill>
                 <a:schemeClr val="bg2">
                   <a:lumMod val="10000"/>
@@ -5918,19 +6600,19 @@
         </p:nvSpPr>
         <p:spPr>
           <a:xfrm>
-            <a:off x="485225" y="1690689"/>
+            <a:off x="452988" y="1242115"/>
             <a:ext cx="5643012" cy="4243580"/>
           </a:xfrm>
         </p:spPr>
         <p:txBody>
           <a:bodyPr>
-            <a:normAutofit/>
+            <a:noAutofit/>
           </a:bodyPr>
           <a:lstStyle/>
           <a:p>
             <a:pPr algn="just"/>
             <a:r>
-              <a:rPr lang="pt-BR" sz="1600" dirty="0">
+              <a:rPr lang="pt-BR" sz="2000" dirty="0">
                 <a:solidFill>
                   <a:schemeClr val="bg2">
                     <a:lumMod val="25000"/>
@@ -5943,7 +6625,7 @@
           <a:p>
             <a:pPr algn="just"/>
             <a:r>
-              <a:rPr lang="pt-BR" sz="1600" dirty="0">
+              <a:rPr lang="pt-BR" sz="2000" dirty="0">
                 <a:solidFill>
                   <a:schemeClr val="bg2">
                     <a:lumMod val="25000"/>
@@ -5952,22 +6634,17 @@
               </a:rPr>
               <a:t>Processamento de Linguagem Natural – PLN.</a:t>
             </a:r>
-            <a:endParaRPr lang="pt-BR" sz="1200" dirty="0">
-              <a:solidFill>
-                <a:schemeClr val="bg2">
-                  <a:lumMod val="25000"/>
-                </a:schemeClr>
-              </a:solidFill>
-            </a:endParaRPr>
-          </a:p>
-          <a:p>
-            <a:pPr marL="666750" lvl="1" algn="just">
+          </a:p>
+          <a:p>
+            <a:pPr marL="895350" lvl="1" indent="-457200" algn="just">
               <a:lnSpc>
                 <a:spcPct val="100000"/>
               </a:lnSpc>
+              <a:buFont typeface="+mj-lt"/>
+              <a:buAutoNum type="alphaLcPeriod"/>
             </a:pPr>
             <a:r>
-              <a:rPr lang="pt-BR" sz="1600" dirty="0">
+              <a:rPr lang="pt-BR" sz="2000" dirty="0">
                 <a:solidFill>
                   <a:schemeClr val="bg2">
                     <a:lumMod val="25000"/>
@@ -5978,9 +6655,12 @@
             </a:r>
           </a:p>
           <a:p>
-            <a:pPr marL="666750" lvl="1" algn="just"/>
-            <a:r>
-              <a:rPr lang="pt-BR" sz="1600" dirty="0">
+            <a:pPr marL="895350" lvl="1" indent="-457200" algn="just">
+              <a:buFont typeface="+mj-lt"/>
+              <a:buAutoNum type="alphaLcPeriod"/>
+            </a:pPr>
+            <a:r>
+              <a:rPr lang="pt-BR" sz="2000" dirty="0">
                 <a:solidFill>
                   <a:schemeClr val="bg2">
                     <a:lumMod val="25000"/>
@@ -5991,9 +6671,12 @@
             </a:r>
           </a:p>
           <a:p>
-            <a:pPr marL="666750" lvl="1" algn="just"/>
-            <a:r>
-              <a:rPr lang="pt-BR" sz="1600" dirty="0">
+            <a:pPr marL="895350" lvl="1" indent="-457200" algn="just">
+              <a:buFont typeface="+mj-lt"/>
+              <a:buAutoNum type="alphaLcPeriod"/>
+            </a:pPr>
+            <a:r>
+              <a:rPr lang="pt-BR" sz="2000" dirty="0">
                 <a:solidFill>
                   <a:schemeClr val="bg2">
                     <a:lumMod val="25000"/>
@@ -6004,9 +6687,12 @@
             </a:r>
           </a:p>
           <a:p>
-            <a:pPr marL="666750" lvl="1" algn="just"/>
-            <a:r>
-              <a:rPr lang="pt-BR" sz="1600" dirty="0">
+            <a:pPr marL="895350" lvl="1" indent="-457200" algn="just">
+              <a:buFont typeface="+mj-lt"/>
+              <a:buAutoNum type="alphaLcPeriod"/>
+            </a:pPr>
+            <a:r>
+              <a:rPr lang="pt-BR" sz="2000" dirty="0">
                 <a:solidFill>
                   <a:schemeClr val="bg2">
                     <a:lumMod val="25000"/>
@@ -6017,9 +6703,12 @@
             </a:r>
           </a:p>
           <a:p>
-            <a:pPr marL="666750" lvl="1" algn="just"/>
-            <a:r>
-              <a:rPr lang="pt-BR" sz="1600" dirty="0">
+            <a:pPr marL="895350" lvl="1" indent="-457200" algn="just">
+              <a:buFont typeface="+mj-lt"/>
+              <a:buAutoNum type="alphaLcPeriod"/>
+            </a:pPr>
+            <a:r>
+              <a:rPr lang="pt-BR" sz="2000" dirty="0">
                 <a:solidFill>
                   <a:schemeClr val="bg2">
                     <a:lumMod val="25000"/>
@@ -6030,9 +6719,12 @@
             </a:r>
           </a:p>
           <a:p>
-            <a:pPr marL="666750" lvl="1" algn="just"/>
-            <a:r>
-              <a:rPr lang="pt-BR" sz="1600" dirty="0">
+            <a:pPr marL="895350" lvl="1" indent="-457200" algn="just">
+              <a:buFont typeface="+mj-lt"/>
+              <a:buAutoNum type="alphaLcPeriod"/>
+            </a:pPr>
+            <a:r>
+              <a:rPr lang="pt-BR" sz="2000" dirty="0">
                 <a:solidFill>
                   <a:schemeClr val="bg2">
                     <a:lumMod val="25000"/>
@@ -6045,7 +6737,7 @@
           <a:p>
             <a:pPr algn="just"/>
             <a:r>
-              <a:rPr lang="pt-BR" sz="1600" dirty="0">
+              <a:rPr lang="pt-BR" sz="2000" dirty="0">
                 <a:solidFill>
                   <a:schemeClr val="bg2">
                     <a:lumMod val="25000"/>
@@ -6058,7 +6750,7 @@
           <a:p>
             <a:pPr algn="just"/>
             <a:r>
-              <a:rPr lang="pt-BR" sz="1600" dirty="0">
+              <a:rPr lang="pt-BR" sz="2000" dirty="0">
                 <a:solidFill>
                   <a:schemeClr val="bg2">
                     <a:lumMod val="25000"/>
@@ -6071,7 +6763,7 @@
           <a:p>
             <a:pPr algn="just"/>
             <a:r>
-              <a:rPr lang="pt-BR" sz="1600" dirty="0">
+              <a:rPr lang="pt-BR" sz="2000" dirty="0">
                 <a:solidFill>
                   <a:schemeClr val="bg2">
                     <a:lumMod val="25000"/>
@@ -6097,8 +6789,8 @@
         </p:nvSpPr>
         <p:spPr>
           <a:xfrm>
-            <a:off x="6316610" y="2815629"/>
-            <a:ext cx="5643012" cy="1783690"/>
+            <a:off x="6307984" y="2008045"/>
+            <a:ext cx="5643012" cy="2841909"/>
           </a:xfrm>
           <a:prstGeom prst="rect">
             <a:avLst/>
@@ -6147,7 +6839,7 @@
               </a:spcBef>
             </a:pPr>
             <a:r>
-              <a:rPr lang="pt-BR" sz="1600" dirty="0">
+              <a:rPr lang="pt-BR" dirty="0">
                 <a:solidFill>
                   <a:schemeClr val="bg2">
                     <a:lumMod val="10000"/>
@@ -6159,7 +6851,7 @@
               <a:t>O objetivo deste trabalho é utilizar técnicas de processamento de linguagem natural nos “</a:t>
             </a:r>
             <a:r>
-              <a:rPr lang="pt-BR" sz="1600" dirty="0" err="1">
+              <a:rPr lang="pt-BR" dirty="0" err="1">
                 <a:solidFill>
                   <a:schemeClr val="bg2">
                     <a:lumMod val="10000"/>
@@ -6171,7 +6863,7 @@
               <a:t>datasets</a:t>
             </a:r>
             <a:r>
-              <a:rPr lang="pt-BR" sz="1600" dirty="0">
+              <a:rPr lang="pt-BR" dirty="0">
                 <a:solidFill>
                   <a:schemeClr val="bg2">
                     <a:lumMod val="10000"/>
@@ -6192,7 +6884,7 @@
                 <a:spcPts val="1000"/>
               </a:spcBef>
             </a:pPr>
-            <a:endParaRPr lang="pt-BR" sz="1600" dirty="0">
+            <a:endParaRPr lang="pt-BR" dirty="0">
               <a:solidFill>
                 <a:schemeClr val="bg2">
                   <a:lumMod val="10000"/>
@@ -6363,7 +7055,7 @@
         <p:spPr>
           <a:xfrm>
             <a:off x="452988" y="2490224"/>
-            <a:ext cx="5643012" cy="1877551"/>
+            <a:ext cx="5643012" cy="2124908"/>
           </a:xfrm>
           <a:prstGeom prst="rect">
             <a:avLst/>
@@ -6412,7 +7104,7 @@
               </a:spcBef>
             </a:pPr>
             <a:r>
-              <a:rPr lang="pt-BR" sz="1600" dirty="0">
+              <a:rPr lang="pt-BR" dirty="0">
                 <a:solidFill>
                   <a:schemeClr val="bg2">
                     <a:lumMod val="10000"/>
@@ -6424,7 +7116,7 @@
               <a:t>A estratégia de pesquisa utilizada no desenvolvimento deste projeto será exploratória, visando apresentar de forma clara e concisa, didática e prática, a implementação das técnicas de processamento de linguagem natural disponibilizadas pela biblioteca “Natural </a:t>
             </a:r>
             <a:r>
-              <a:rPr lang="pt-BR" sz="1600" dirty="0" err="1">
+              <a:rPr lang="pt-BR" dirty="0" err="1">
                 <a:solidFill>
                   <a:schemeClr val="bg2">
                     <a:lumMod val="10000"/>
@@ -6436,7 +7128,7 @@
               <a:t>Language</a:t>
             </a:r>
             <a:r>
-              <a:rPr lang="pt-BR" sz="1600" dirty="0">
+              <a:rPr lang="pt-BR" dirty="0">
                 <a:solidFill>
                   <a:schemeClr val="bg2">
                     <a:lumMod val="10000"/>
@@ -6459,7 +7151,7 @@
               <a:buFont typeface="Arial" panose="020B0604020202020204" pitchFamily="34" charset="0"/>
               <a:buChar char="•"/>
             </a:pPr>
-            <a:endParaRPr lang="pt-BR" sz="1600" b="1" dirty="0">
+            <a:endParaRPr lang="pt-BR" b="1" dirty="0">
               <a:solidFill>
                 <a:schemeClr val="bg2">
                   <a:lumMod val="10000"/>
@@ -6487,8 +7179,8 @@
         </p:nvSpPr>
         <p:spPr>
           <a:xfrm>
-            <a:off x="6283193" y="2069826"/>
-            <a:ext cx="5643012" cy="3171022"/>
+            <a:off x="6283193" y="1843489"/>
+            <a:ext cx="5643012" cy="3504888"/>
           </a:xfrm>
           <a:prstGeom prst="rect">
             <a:avLst/>
@@ -6496,7 +7188,7 @@
         </p:spPr>
         <p:txBody>
           <a:bodyPr vert="horz" lIns="91440" tIns="45720" rIns="91440" bIns="45720" rtlCol="0">
-            <a:normAutofit/>
+            <a:noAutofit/>
           </a:bodyPr>
           <a:lstStyle>
             <a:lvl1pPr marL="228600" indent="-228600" algn="l" defTabSz="914400" rtl="0" eaLnBrk="1" latinLnBrk="0" hangingPunct="1">
@@ -6665,7 +7357,7 @@
           <a:p>
             <a:pPr algn="just"/>
             <a:r>
-              <a:rPr lang="pt-BR" sz="1600" dirty="0">
+              <a:rPr lang="pt-BR" sz="2000" dirty="0">
                 <a:solidFill>
                   <a:schemeClr val="bg2">
                     <a:lumMod val="25000"/>
@@ -6675,7 +7367,7 @@
               <a:t>NLTK – Natural </a:t>
             </a:r>
             <a:r>
-              <a:rPr lang="pt-BR" sz="1600" dirty="0" err="1">
+              <a:rPr lang="pt-BR" sz="2000" dirty="0" err="1">
                 <a:solidFill>
                   <a:schemeClr val="bg2">
                     <a:lumMod val="25000"/>
@@ -6685,7 +7377,7 @@
               <a:t>Language</a:t>
             </a:r>
             <a:r>
-              <a:rPr lang="pt-BR" sz="1600" dirty="0">
+              <a:rPr lang="pt-BR" sz="2000" dirty="0">
                 <a:solidFill>
                   <a:schemeClr val="bg2">
                     <a:lumMod val="25000"/>
@@ -6694,22 +7386,17 @@
               </a:rPr>
               <a:t> Toolkit.</a:t>
             </a:r>
-            <a:endParaRPr lang="pt-BR" sz="1200" dirty="0">
-              <a:solidFill>
-                <a:schemeClr val="bg2">
-                  <a:lumMod val="25000"/>
-                </a:schemeClr>
-              </a:solidFill>
-            </a:endParaRPr>
-          </a:p>
-          <a:p>
-            <a:pPr marL="666750" lvl="1" algn="just">
+          </a:p>
+          <a:p>
+            <a:pPr marL="895350" lvl="1" indent="-457200" algn="just">
               <a:lnSpc>
                 <a:spcPct val="100000"/>
               </a:lnSpc>
+              <a:buFont typeface="+mj-lt"/>
+              <a:buAutoNum type="alphaLcPeriod"/>
             </a:pPr>
             <a:r>
-              <a:rPr lang="pt-BR" sz="1600" dirty="0">
+              <a:rPr lang="pt-BR" sz="2000" dirty="0">
                 <a:solidFill>
                   <a:schemeClr val="bg2">
                     <a:lumMod val="25000"/>
@@ -6720,13 +7407,15 @@
             </a:r>
           </a:p>
           <a:p>
-            <a:pPr marL="666750" lvl="1" algn="just">
+            <a:pPr marL="895350" lvl="1" indent="-457200" algn="just">
               <a:lnSpc>
                 <a:spcPct val="100000"/>
               </a:lnSpc>
+              <a:buFont typeface="+mj-lt"/>
+              <a:buAutoNum type="alphaLcPeriod"/>
             </a:pPr>
             <a:r>
-              <a:rPr lang="pt-BR" sz="1600" dirty="0">
+              <a:rPr lang="pt-BR" sz="2000" dirty="0">
                 <a:solidFill>
                   <a:schemeClr val="bg2">
                     <a:lumMod val="25000"/>
@@ -6737,9 +7426,12 @@
             </a:r>
           </a:p>
           <a:p>
-            <a:pPr marL="666750" lvl="1" algn="just"/>
-            <a:r>
-              <a:rPr lang="pt-BR" sz="1600" dirty="0">
+            <a:pPr marL="895350" lvl="1" indent="-457200" algn="just">
+              <a:buFont typeface="+mj-lt"/>
+              <a:buAutoNum type="alphaLcPeriod"/>
+            </a:pPr>
+            <a:r>
+              <a:rPr lang="pt-BR" sz="2000" dirty="0">
                 <a:solidFill>
                   <a:schemeClr val="bg2">
                     <a:lumMod val="25000"/>
@@ -6750,9 +7442,12 @@
             </a:r>
           </a:p>
           <a:p>
-            <a:pPr marL="666750" lvl="1" algn="just"/>
-            <a:r>
-              <a:rPr lang="pt-BR" sz="1600" dirty="0">
+            <a:pPr marL="895350" lvl="1" indent="-457200" algn="just">
+              <a:buFont typeface="+mj-lt"/>
+              <a:buAutoNum type="alphaLcPeriod"/>
+            </a:pPr>
+            <a:r>
+              <a:rPr lang="pt-BR" sz="2000" dirty="0">
                 <a:solidFill>
                   <a:schemeClr val="bg2">
                     <a:lumMod val="25000"/>
@@ -6763,9 +7458,12 @@
             </a:r>
           </a:p>
           <a:p>
-            <a:pPr marL="666750" lvl="1" algn="just"/>
-            <a:r>
-              <a:rPr lang="pt-BR" sz="1600" dirty="0">
+            <a:pPr marL="895350" lvl="1" indent="-457200" algn="just">
+              <a:buFont typeface="+mj-lt"/>
+              <a:buAutoNum type="alphaLcPeriod"/>
+            </a:pPr>
+            <a:r>
+              <a:rPr lang="pt-BR" sz="2000" dirty="0">
                 <a:solidFill>
                   <a:schemeClr val="bg2">
                     <a:lumMod val="25000"/>
@@ -6778,7 +7476,7 @@
           <a:p>
             <a:pPr algn="just"/>
             <a:r>
-              <a:rPr lang="pt-BR" sz="1600" dirty="0">
+              <a:rPr lang="pt-BR" sz="2000" dirty="0">
                 <a:solidFill>
                   <a:schemeClr val="bg2">
                     <a:lumMod val="25000"/>
@@ -6791,7 +7489,7 @@
           <a:p>
             <a:pPr algn="just"/>
             <a:r>
-              <a:rPr lang="pt-BR" sz="1600" dirty="0">
+              <a:rPr lang="pt-BR" sz="2000" dirty="0">
                 <a:solidFill>
                   <a:schemeClr val="bg2">
                     <a:lumMod val="25000"/>
@@ -6962,8 +7660,8 @@
         </p:nvSpPr>
         <p:spPr>
           <a:xfrm>
-            <a:off x="319248" y="3254056"/>
-            <a:ext cx="5643012" cy="2214238"/>
+            <a:off x="319248" y="3254055"/>
+            <a:ext cx="5643012" cy="2561269"/>
           </a:xfrm>
           <a:prstGeom prst="rect">
             <a:avLst/>
@@ -7012,7 +7710,7 @@
               <a:buChar char="•"/>
             </a:pPr>
             <a:r>
-              <a:rPr lang="pt-BR" sz="1600" dirty="0">
+              <a:rPr lang="pt-BR" dirty="0">
                 <a:solidFill>
                   <a:schemeClr val="bg2">
                     <a:lumMod val="10000"/>
@@ -7024,7 +7722,7 @@
               <a:t>Para a extração de informações dos livros, foi utilizado arquivos no formato .</a:t>
             </a:r>
             <a:r>
-              <a:rPr lang="pt-BR" sz="1600" dirty="0" err="1">
+              <a:rPr lang="pt-BR" dirty="0" err="1">
                 <a:solidFill>
                   <a:schemeClr val="bg2">
                     <a:lumMod val="10000"/>
@@ -7036,7 +7734,7 @@
               <a:t>txt</a:t>
             </a:r>
             <a:r>
-              <a:rPr lang="pt-BR" sz="1600" dirty="0">
+              <a:rPr lang="pt-BR" dirty="0">
                 <a:solidFill>
                   <a:schemeClr val="bg2">
                     <a:lumMod val="10000"/>
@@ -7060,7 +7758,7 @@
               <a:buChar char="•"/>
             </a:pPr>
             <a:r>
-              <a:rPr lang="pt-BR" sz="1600" dirty="0">
+              <a:rPr lang="pt-BR" dirty="0">
                 <a:solidFill>
                   <a:schemeClr val="bg2">
                     <a:lumMod val="10000"/>
@@ -7072,7 +7770,7 @@
               <a:t>Para a extração de informações dos filmes, foi utilizado </a:t>
             </a:r>
             <a:r>
-              <a:rPr lang="pt-BR" sz="1600" dirty="0" err="1">
+              <a:rPr lang="pt-BR" dirty="0" err="1">
                 <a:solidFill>
                   <a:schemeClr val="bg2">
                     <a:lumMod val="10000"/>
@@ -7084,7 +7782,7 @@
               <a:t>datasets</a:t>
             </a:r>
             <a:r>
-              <a:rPr lang="pt-BR" sz="1600" dirty="0">
+              <a:rPr lang="pt-BR" dirty="0">
                 <a:solidFill>
                   <a:schemeClr val="bg2">
                     <a:lumMod val="10000"/>
@@ -7107,7 +7805,7 @@
               <a:buFont typeface="Arial" panose="020B0604020202020204" pitchFamily="34" charset="0"/>
               <a:buChar char="•"/>
             </a:pPr>
-            <a:endParaRPr lang="pt-BR" sz="1600" dirty="0">
+            <a:endParaRPr lang="pt-BR" dirty="0">
               <a:solidFill>
                 <a:schemeClr val="bg2">
                   <a:lumMod val="10000"/>
@@ -7127,7 +7825,7 @@
               </a:spcBef>
             </a:pPr>
             <a:r>
-              <a:rPr lang="pt-BR" sz="1600" dirty="0">
+              <a:rPr lang="pt-BR" dirty="0">
                 <a:solidFill>
                   <a:schemeClr val="bg2">
                     <a:lumMod val="10000"/>
@@ -7338,7 +8036,7 @@
               <a:buNone/>
             </a:pPr>
             <a:r>
-              <a:rPr lang="pt-BR" sz="1600" dirty="0">
+              <a:rPr lang="pt-BR" sz="1800" dirty="0">
                 <a:solidFill>
                   <a:schemeClr val="bg2">
                     <a:lumMod val="25000"/>
@@ -7355,7 +8053,7 @@
               <a:buFont typeface="Arial" panose="020B0604020202020204" pitchFamily="34" charset="0"/>
               <a:buNone/>
             </a:pPr>
-            <a:endParaRPr lang="pt-BR" sz="1600" b="1" dirty="0">
+            <a:endParaRPr lang="pt-BR" sz="1800" b="1" dirty="0">
               <a:solidFill>
                 <a:schemeClr val="bg2">
                   <a:lumMod val="25000"/>
@@ -7383,8 +8081,8 @@
         </p:nvSpPr>
         <p:spPr>
           <a:xfrm>
-            <a:off x="7259541" y="2148365"/>
-            <a:ext cx="3148717" cy="2561269"/>
+            <a:off x="7259541" y="1906631"/>
+            <a:ext cx="3445840" cy="3044737"/>
           </a:xfrm>
           <a:prstGeom prst="rect">
             <a:avLst/>
@@ -7564,7 +8262,7 @@
               <a:buNone/>
             </a:pPr>
             <a:r>
-              <a:rPr lang="pt-BR" sz="1600" b="1" dirty="0">
+              <a:rPr lang="pt-BR" sz="1800" b="1" dirty="0">
                 <a:solidFill>
                   <a:schemeClr val="bg2">
                     <a:lumMod val="25000"/>
@@ -7582,7 +8280,7 @@
               <a:buAutoNum type="arabicPeriod"/>
             </a:pPr>
             <a:r>
-              <a:rPr lang="pt-BR" sz="1600" dirty="0">
+              <a:rPr lang="pt-BR" sz="1800" dirty="0">
                 <a:solidFill>
                   <a:schemeClr val="bg2">
                     <a:lumMod val="25000"/>
@@ -7594,7 +8292,7 @@
               <a:t>The </a:t>
             </a:r>
             <a:r>
-              <a:rPr lang="pt-BR" sz="1600" dirty="0" err="1">
+              <a:rPr lang="pt-BR" sz="1800" dirty="0" err="1">
                 <a:solidFill>
                   <a:schemeClr val="bg2">
                     <a:lumMod val="25000"/>
@@ -7606,7 +8304,7 @@
               <a:t>Philosopher's</a:t>
             </a:r>
             <a:r>
-              <a:rPr lang="pt-BR" sz="1600" dirty="0">
+              <a:rPr lang="pt-BR" sz="1800" dirty="0">
                 <a:solidFill>
                   <a:schemeClr val="bg2">
                     <a:lumMod val="25000"/>
@@ -7624,7 +8322,7 @@
               <a:buAutoNum type="arabicPeriod"/>
             </a:pPr>
             <a:r>
-              <a:rPr lang="pt-BR" sz="1600" dirty="0">
+              <a:rPr lang="pt-BR" sz="1800" dirty="0">
                 <a:solidFill>
                   <a:schemeClr val="bg2">
                     <a:lumMod val="25000"/>
@@ -7636,7 +8334,7 @@
               <a:t>The Chamber </a:t>
             </a:r>
             <a:r>
-              <a:rPr lang="pt-BR" sz="1600" dirty="0" err="1">
+              <a:rPr lang="pt-BR" sz="1800" dirty="0" err="1">
                 <a:solidFill>
                   <a:schemeClr val="bg2">
                     <a:lumMod val="25000"/>
@@ -7648,7 +8346,7 @@
               <a:t>of</a:t>
             </a:r>
             <a:r>
-              <a:rPr lang="pt-BR" sz="1600" dirty="0">
+              <a:rPr lang="pt-BR" sz="1800" dirty="0">
                 <a:solidFill>
                   <a:schemeClr val="bg2">
                     <a:lumMod val="25000"/>
@@ -7660,7 +8358,7 @@
               <a:t> </a:t>
             </a:r>
             <a:r>
-              <a:rPr lang="pt-BR" sz="1600" dirty="0" err="1">
+              <a:rPr lang="pt-BR" sz="1800" dirty="0" err="1">
                 <a:solidFill>
                   <a:schemeClr val="bg2">
                     <a:lumMod val="25000"/>
@@ -7671,7 +8369,7 @@
               </a:rPr>
               <a:t>Secrets</a:t>
             </a:r>
-            <a:endParaRPr lang="pt-BR" sz="1600" dirty="0">
+            <a:endParaRPr lang="pt-BR" sz="1800" dirty="0">
               <a:solidFill>
                 <a:schemeClr val="bg2">
                   <a:lumMod val="25000"/>
@@ -7687,7 +8385,7 @@
               <a:buAutoNum type="arabicPeriod"/>
             </a:pPr>
             <a:r>
-              <a:rPr lang="pt-BR" sz="1600" dirty="0">
+              <a:rPr lang="pt-BR" sz="1800" dirty="0">
                 <a:solidFill>
                   <a:schemeClr val="bg2">
                     <a:lumMod val="25000"/>
@@ -7699,7 +8397,7 @@
               <a:t>The </a:t>
             </a:r>
             <a:r>
-              <a:rPr lang="pt-BR" sz="1600" dirty="0" err="1">
+              <a:rPr lang="pt-BR" sz="1800" dirty="0" err="1">
                 <a:solidFill>
                   <a:schemeClr val="bg2">
                     <a:lumMod val="25000"/>
@@ -7711,7 +8409,7 @@
               <a:t>Prisoner</a:t>
             </a:r>
             <a:r>
-              <a:rPr lang="pt-BR" sz="1600" dirty="0">
+              <a:rPr lang="pt-BR" sz="1800" dirty="0">
                 <a:solidFill>
                   <a:schemeClr val="bg2">
                     <a:lumMod val="25000"/>
@@ -7723,7 +8421,7 @@
               <a:t> </a:t>
             </a:r>
             <a:r>
-              <a:rPr lang="pt-BR" sz="1600" dirty="0" err="1">
+              <a:rPr lang="pt-BR" sz="1800" dirty="0" err="1">
                 <a:solidFill>
                   <a:schemeClr val="bg2">
                     <a:lumMod val="25000"/>
@@ -7735,7 +8433,7 @@
               <a:t>of</a:t>
             </a:r>
             <a:r>
-              <a:rPr lang="pt-BR" sz="1600" dirty="0">
+              <a:rPr lang="pt-BR" sz="1800" dirty="0">
                 <a:solidFill>
                   <a:schemeClr val="bg2">
                     <a:lumMod val="25000"/>
@@ -7753,7 +8451,7 @@
               <a:buAutoNum type="arabicPeriod"/>
             </a:pPr>
             <a:r>
-              <a:rPr lang="pt-BR" sz="1600" dirty="0">
+              <a:rPr lang="pt-BR" sz="1800" dirty="0">
                 <a:solidFill>
                   <a:schemeClr val="bg2">
                     <a:lumMod val="25000"/>
@@ -7765,7 +8463,7 @@
               <a:t>The </a:t>
             </a:r>
             <a:r>
-              <a:rPr lang="pt-BR" sz="1600" dirty="0" err="1">
+              <a:rPr lang="pt-BR" sz="1800" dirty="0" err="1">
                 <a:solidFill>
                   <a:schemeClr val="bg2">
                     <a:lumMod val="25000"/>
@@ -7777,7 +8475,7 @@
               <a:t>Goblet</a:t>
             </a:r>
             <a:r>
-              <a:rPr lang="pt-BR" sz="1600" dirty="0">
+              <a:rPr lang="pt-BR" sz="1800" dirty="0">
                 <a:solidFill>
                   <a:schemeClr val="bg2">
                     <a:lumMod val="25000"/>
@@ -7789,7 +8487,7 @@
               <a:t> </a:t>
             </a:r>
             <a:r>
-              <a:rPr lang="pt-BR" sz="1600" dirty="0" err="1">
+              <a:rPr lang="pt-BR" sz="1800" dirty="0" err="1">
                 <a:solidFill>
                   <a:schemeClr val="bg2">
                     <a:lumMod val="25000"/>
@@ -7801,7 +8499,7 @@
               <a:t>of</a:t>
             </a:r>
             <a:r>
-              <a:rPr lang="pt-BR" sz="1600" dirty="0">
+              <a:rPr lang="pt-BR" sz="1800" dirty="0">
                 <a:solidFill>
                   <a:schemeClr val="bg2">
                     <a:lumMod val="25000"/>
@@ -7813,7 +8511,7 @@
               <a:t> </a:t>
             </a:r>
             <a:r>
-              <a:rPr lang="pt-BR" sz="1600" dirty="0" err="1">
+              <a:rPr lang="pt-BR" sz="1800" dirty="0" err="1">
                 <a:solidFill>
                   <a:schemeClr val="bg2">
                     <a:lumMod val="25000"/>
@@ -7824,7 +8522,7 @@
               </a:rPr>
               <a:t>Fire</a:t>
             </a:r>
-            <a:endParaRPr lang="pt-BR" sz="1600" dirty="0">
+            <a:endParaRPr lang="pt-BR" sz="1800" dirty="0">
               <a:solidFill>
                 <a:schemeClr val="bg2">
                   <a:lumMod val="25000"/>
@@ -7840,7 +8538,7 @@
               <a:buAutoNum type="arabicPeriod"/>
             </a:pPr>
             <a:r>
-              <a:rPr lang="pt-BR" sz="1600" dirty="0">
+              <a:rPr lang="pt-BR" sz="1800" dirty="0">
                 <a:solidFill>
                   <a:schemeClr val="bg2">
                     <a:lumMod val="25000"/>
@@ -7852,7 +8550,7 @@
               <a:t>The </a:t>
             </a:r>
             <a:r>
-              <a:rPr lang="pt-BR" sz="1600" dirty="0" err="1">
+              <a:rPr lang="pt-BR" sz="1800" dirty="0" err="1">
                 <a:solidFill>
                   <a:schemeClr val="bg2">
                     <a:lumMod val="25000"/>
@@ -7864,7 +8562,7 @@
               <a:t>Order</a:t>
             </a:r>
             <a:r>
-              <a:rPr lang="pt-BR" sz="1600" dirty="0">
+              <a:rPr lang="pt-BR" sz="1800" dirty="0">
                 <a:solidFill>
                   <a:schemeClr val="bg2">
                     <a:lumMod val="25000"/>
@@ -7876,7 +8574,7 @@
               <a:t> </a:t>
             </a:r>
             <a:r>
-              <a:rPr lang="pt-BR" sz="1600" dirty="0" err="1">
+              <a:rPr lang="pt-BR" sz="1800" dirty="0" err="1">
                 <a:solidFill>
                   <a:schemeClr val="bg2">
                     <a:lumMod val="25000"/>
@@ -7888,7 +8586,7 @@
               <a:t>of</a:t>
             </a:r>
             <a:r>
-              <a:rPr lang="pt-BR" sz="1600" dirty="0">
+              <a:rPr lang="pt-BR" sz="1800" dirty="0">
                 <a:solidFill>
                   <a:schemeClr val="bg2">
                     <a:lumMod val="25000"/>
@@ -7900,7 +8598,7 @@
               <a:t> </a:t>
             </a:r>
             <a:r>
-              <a:rPr lang="pt-BR" sz="1600" dirty="0" err="1">
+              <a:rPr lang="pt-BR" sz="1800" dirty="0" err="1">
                 <a:solidFill>
                   <a:schemeClr val="bg2">
                     <a:lumMod val="25000"/>
@@ -7912,7 +8610,7 @@
               <a:t>the</a:t>
             </a:r>
             <a:r>
-              <a:rPr lang="pt-BR" sz="1600" dirty="0">
+              <a:rPr lang="pt-BR" sz="1800" dirty="0">
                 <a:solidFill>
                   <a:schemeClr val="bg2">
                     <a:lumMod val="25000"/>
@@ -7930,7 +8628,7 @@
               <a:buAutoNum type="arabicPeriod"/>
             </a:pPr>
             <a:r>
-              <a:rPr lang="pt-BR" sz="1600" dirty="0">
+              <a:rPr lang="pt-BR" sz="1800" dirty="0">
                 <a:solidFill>
                   <a:schemeClr val="bg2">
                     <a:lumMod val="25000"/>
@@ -7942,7 +8640,7 @@
               <a:t>The Half </a:t>
             </a:r>
             <a:r>
-              <a:rPr lang="pt-BR" sz="1600" dirty="0" err="1">
+              <a:rPr lang="pt-BR" sz="1800" dirty="0" err="1">
                 <a:solidFill>
                   <a:schemeClr val="bg2">
                     <a:lumMod val="25000"/>
@@ -7954,7 +8652,7 @@
               <a:t>Blood</a:t>
             </a:r>
             <a:r>
-              <a:rPr lang="pt-BR" sz="1600" dirty="0">
+              <a:rPr lang="pt-BR" sz="1800" dirty="0">
                 <a:solidFill>
                   <a:schemeClr val="bg2">
                     <a:lumMod val="25000"/>
@@ -7972,7 +8670,7 @@
               <a:buAutoNum type="arabicPeriod"/>
             </a:pPr>
             <a:r>
-              <a:rPr lang="pt-BR" sz="1600" dirty="0">
+              <a:rPr lang="pt-BR" sz="1800" dirty="0">
                 <a:solidFill>
                   <a:schemeClr val="bg2">
                     <a:lumMod val="25000"/>
@@ -7984,7 +8682,7 @@
               <a:t>The </a:t>
             </a:r>
             <a:r>
-              <a:rPr lang="pt-BR" sz="1600" dirty="0" err="1">
+              <a:rPr lang="pt-BR" sz="1800" dirty="0" err="1">
                 <a:solidFill>
                   <a:schemeClr val="bg2">
                     <a:lumMod val="25000"/>
@@ -7996,7 +8694,7 @@
               <a:t>Deathly</a:t>
             </a:r>
             <a:r>
-              <a:rPr lang="pt-BR" sz="1600" dirty="0">
+              <a:rPr lang="pt-BR" sz="1800" dirty="0">
                 <a:solidFill>
                   <a:schemeClr val="bg2">
                     <a:lumMod val="25000"/>
@@ -8008,7 +8706,7 @@
               <a:t> </a:t>
             </a:r>
             <a:r>
-              <a:rPr lang="pt-BR" sz="1600" dirty="0" err="1">
+              <a:rPr lang="pt-BR" sz="1800" dirty="0" err="1">
                 <a:solidFill>
                   <a:schemeClr val="bg2">
                     <a:lumMod val="25000"/>
@@ -8019,7 +8717,7 @@
               </a:rPr>
               <a:t>Hallows</a:t>
             </a:r>
-            <a:endParaRPr lang="pt-BR" sz="1600" dirty="0">
+            <a:endParaRPr lang="pt-BR" sz="1800" dirty="0">
               <a:solidFill>
                 <a:schemeClr val="bg2">
                   <a:lumMod val="25000"/>
@@ -8076,7 +8774,7 @@
         <p:spPr>
           <a:xfrm>
             <a:off x="319248" y="2947307"/>
-            <a:ext cx="5643012" cy="2740421"/>
+            <a:ext cx="5688188" cy="2950708"/>
           </a:xfrm>
           <a:prstGeom prst="rect">
             <a:avLst/>
@@ -8125,7 +8823,7 @@
               <a:buChar char="•"/>
             </a:pPr>
             <a:r>
-              <a:rPr lang="pt-BR" sz="1600" dirty="0">
+              <a:rPr lang="pt-BR" dirty="0">
                 <a:solidFill>
                   <a:schemeClr val="bg2">
                     <a:lumMod val="10000"/>
@@ -8149,7 +8847,7 @@
               <a:buChar char="•"/>
             </a:pPr>
             <a:r>
-              <a:rPr lang="pt-BR" sz="1600" dirty="0">
+              <a:rPr lang="pt-BR" dirty="0">
                 <a:solidFill>
                   <a:schemeClr val="bg2">
                     <a:lumMod val="10000"/>
@@ -8173,7 +8871,7 @@
               <a:buChar char="•"/>
             </a:pPr>
             <a:r>
-              <a:rPr lang="pt-BR" sz="1600" dirty="0" err="1">
+              <a:rPr lang="pt-BR" dirty="0" err="1">
                 <a:solidFill>
                   <a:schemeClr val="bg2">
                     <a:lumMod val="10000"/>
@@ -8185,7 +8883,7 @@
               <a:t>Stopwords</a:t>
             </a:r>
             <a:r>
-              <a:rPr lang="pt-BR" sz="1600" dirty="0">
+              <a:rPr lang="pt-BR" dirty="0">
                 <a:solidFill>
                   <a:schemeClr val="bg2">
                     <a:lumMod val="10000"/>
@@ -8209,7 +8907,7 @@
               <a:buChar char="•"/>
             </a:pPr>
             <a:r>
-              <a:rPr lang="pt-BR" sz="1600" dirty="0">
+              <a:rPr lang="pt-BR" dirty="0">
                 <a:solidFill>
                   <a:schemeClr val="bg2">
                     <a:lumMod val="10000"/>
@@ -8233,7 +8931,7 @@
               <a:buChar char="•"/>
             </a:pPr>
             <a:r>
-              <a:rPr lang="pt-BR" sz="1600" dirty="0">
+              <a:rPr lang="pt-BR" dirty="0">
                 <a:solidFill>
                   <a:schemeClr val="bg2">
                     <a:lumMod val="10000"/>
@@ -8257,7 +8955,7 @@
               <a:buChar char="•"/>
             </a:pPr>
             <a:r>
-              <a:rPr lang="pt-BR" sz="1600" dirty="0">
+              <a:rPr lang="pt-BR" dirty="0">
                 <a:solidFill>
                   <a:schemeClr val="bg2">
                     <a:lumMod val="10000"/>
@@ -8289,13 +8987,13 @@
         </p:nvSpPr>
         <p:spPr>
           <a:xfrm>
-            <a:off x="319248" y="2298453"/>
-            <a:ext cx="5643012" cy="955603"/>
+            <a:off x="319248" y="2044460"/>
+            <a:ext cx="5643012" cy="902848"/>
           </a:xfrm>
         </p:spPr>
         <p:txBody>
           <a:bodyPr>
-            <a:normAutofit/>
+            <a:noAutofit/>
           </a:bodyPr>
           <a:lstStyle/>
           <a:p>
@@ -8303,7 +9001,7 @@
               <a:buNone/>
             </a:pPr>
             <a:r>
-              <a:rPr lang="pt-BR" sz="1600" dirty="0">
+              <a:rPr lang="pt-BR" sz="1800" dirty="0">
                 <a:solidFill>
                   <a:schemeClr val="bg2">
                     <a:lumMod val="25000"/>
@@ -8319,7 +9017,7 @@
             <a:pPr marL="0" indent="0" algn="just">
               <a:buNone/>
             </a:pPr>
-            <a:endParaRPr lang="pt-BR" sz="1600" b="1" dirty="0">
+            <a:endParaRPr lang="pt-BR" sz="1800" b="1" dirty="0">
               <a:solidFill>
                 <a:schemeClr val="bg2">
                   <a:lumMod val="25000"/>
@@ -10140,7 +10838,7 @@
               <a:buChar char="•"/>
             </a:pPr>
             <a:r>
-              <a:rPr lang="pt-BR" sz="1600" dirty="0">
+              <a:rPr lang="pt-BR" dirty="0">
                 <a:solidFill>
                   <a:schemeClr val="bg2">
                     <a:lumMod val="10000"/>
@@ -10164,7 +10862,7 @@
               <a:buChar char="•"/>
             </a:pPr>
             <a:r>
-              <a:rPr lang="pt-BR" sz="1600" dirty="0">
+              <a:rPr lang="pt-BR" dirty="0">
                 <a:solidFill>
                   <a:schemeClr val="bg2">
                     <a:lumMod val="10000"/>
@@ -10176,7 +10874,7 @@
               <a:t>Google </a:t>
             </a:r>
             <a:r>
-              <a:rPr lang="pt-BR" sz="1600" dirty="0" err="1">
+              <a:rPr lang="pt-BR" dirty="0" err="1">
                 <a:solidFill>
                   <a:schemeClr val="bg2">
                     <a:lumMod val="10000"/>
@@ -10188,7 +10886,7 @@
               <a:t>Colab</a:t>
             </a:r>
             <a:r>
-              <a:rPr lang="pt-BR" sz="1600" dirty="0">
+              <a:rPr lang="pt-BR" dirty="0">
                 <a:solidFill>
                   <a:schemeClr val="bg2">
                     <a:lumMod val="10000"/>
@@ -10212,7 +10910,7 @@
               <a:buChar char="•"/>
             </a:pPr>
             <a:r>
-              <a:rPr lang="pt-BR" sz="1600" dirty="0">
+              <a:rPr lang="pt-BR" dirty="0">
                 <a:solidFill>
                   <a:schemeClr val="bg2">
                     <a:lumMod val="10000"/>
@@ -10320,7 +11018,7 @@
               <a:buChar char="•"/>
             </a:pPr>
             <a:r>
-              <a:rPr lang="pt-BR" sz="1600" dirty="0">
+              <a:rPr lang="pt-BR" dirty="0">
                 <a:solidFill>
                   <a:schemeClr val="bg2">
                     <a:lumMod val="10000"/>
@@ -10332,7 +11030,7 @@
               <a:t>Implementação de expressões regulares (</a:t>
             </a:r>
             <a:r>
-              <a:rPr lang="pt-BR" sz="1600" dirty="0" err="1">
+              <a:rPr lang="pt-BR" dirty="0" err="1">
                 <a:solidFill>
                   <a:schemeClr val="bg2">
                     <a:lumMod val="10000"/>
@@ -10344,7 +11042,7 @@
               <a:t>ReGex</a:t>
             </a:r>
             <a:r>
-              <a:rPr lang="pt-BR" sz="1600" dirty="0">
+              <a:rPr lang="pt-BR" dirty="0">
                 <a:solidFill>
                   <a:schemeClr val="bg2">
                     <a:lumMod val="10000"/>
@@ -10368,7 +11066,7 @@
               <a:buChar char="•"/>
             </a:pPr>
             <a:r>
-              <a:rPr lang="pt-BR" sz="1600" dirty="0">
+              <a:rPr lang="pt-BR" dirty="0">
                 <a:solidFill>
                   <a:schemeClr val="bg2">
                     <a:lumMod val="10000"/>
@@ -10389,10 +11087,10 @@
                 <a:spcPts val="1000"/>
               </a:spcBef>
               <a:buFont typeface="+mj-lt"/>
-              <a:buAutoNum type="alphaLcParenR"/>
+              <a:buAutoNum type="alphaLcPeriod"/>
             </a:pPr>
             <a:r>
-              <a:rPr lang="pt-BR" sz="1600" dirty="0" err="1">
+              <a:rPr lang="pt-BR" dirty="0" err="1">
                 <a:solidFill>
                   <a:schemeClr val="bg2">
                     <a:lumMod val="10000"/>
@@ -10404,7 +11102,7 @@
               <a:t>Stopwords</a:t>
             </a:r>
             <a:r>
-              <a:rPr lang="pt-BR" sz="1600" dirty="0">
+              <a:rPr lang="pt-BR" dirty="0">
                 <a:solidFill>
                   <a:schemeClr val="bg2">
                     <a:lumMod val="10000"/>
@@ -10428,7 +11126,7 @@
               <a:buChar char="•"/>
             </a:pPr>
             <a:r>
-              <a:rPr lang="pt-BR" sz="1600" dirty="0">
+              <a:rPr lang="pt-BR" dirty="0">
                 <a:solidFill>
                   <a:schemeClr val="bg2">
                     <a:lumMod val="10000"/>
@@ -10452,7 +11150,7 @@
               <a:buChar char="•"/>
             </a:pPr>
             <a:r>
-              <a:rPr lang="pt-BR" sz="1600" dirty="0">
+              <a:rPr lang="pt-BR" dirty="0">
                 <a:solidFill>
                   <a:schemeClr val="bg2">
                     <a:lumMod val="10000"/>
@@ -10476,7 +11174,7 @@
               <a:buChar char="•"/>
             </a:pPr>
             <a:r>
-              <a:rPr lang="pt-BR" sz="1600" dirty="0" err="1">
+              <a:rPr lang="pt-BR" dirty="0" err="1">
                 <a:solidFill>
                   <a:schemeClr val="bg2">
                     <a:lumMod val="10000"/>
@@ -10488,7 +11186,7 @@
               <a:t>FreqDist</a:t>
             </a:r>
             <a:r>
-              <a:rPr lang="pt-BR" sz="1600" dirty="0">
+              <a:rPr lang="pt-BR" dirty="0">
                 <a:solidFill>
                   <a:schemeClr val="bg2">
                     <a:lumMod val="10000"/>
@@ -10511,7 +11209,7 @@
               <a:buFont typeface="Arial" panose="020B0604020202020204" pitchFamily="34" charset="0"/>
               <a:buChar char="•"/>
             </a:pPr>
-            <a:endParaRPr lang="pt-BR" sz="1600" dirty="0">
+            <a:endParaRPr lang="pt-BR" dirty="0">
               <a:solidFill>
                 <a:schemeClr val="bg2">
                   <a:lumMod val="10000"/>

</xml_diff>